<commit_message>
increased font size in some figures
</commit_message>
<xml_diff>
--- a/figs/ptperfigure.pptx
+++ b/figs/ptperfigure.pptx
@@ -104,6 +104,22 @@
       </a:defRPr>
     </a:lvl9pPr>
   </p:defaultTextStyle>
+  <p:extLst>
+    <p:ext uri="{EFAFB233-063F-42B5-8137-9DF3F51BA10A}">
+      <p15:sldGuideLst xmlns:p15="http://schemas.microsoft.com/office/powerpoint/2012/main">
+        <p15:guide id="1" orient="horz" pos="2160">
+          <p15:clr>
+            <a:srgbClr val="A4A3A4"/>
+          </p15:clr>
+        </p15:guide>
+        <p15:guide id="2" pos="2880">
+          <p15:clr>
+            <a:srgbClr val="A4A3A4"/>
+          </p15:clr>
+        </p15:guide>
+      </p15:sldGuideLst>
+    </p:ext>
+  </p:extLst>
 </p:presentation>
 </file>
 
@@ -288,7 +304,7 @@
           <a:p>
             <a:fld id="{BF347AA0-A31F-6842-999B-72F4F5D0F40D}" type="datetimeFigureOut">
               <a:rPr lang="en-US" smtClean="0"/>
-              <a:t>2/28/16</a:t>
+              <a:t>3/1/2016</a:t>
             </a:fld>
             <a:endParaRPr lang="en-US"/>
           </a:p>
@@ -458,7 +474,7 @@
           <a:p>
             <a:fld id="{BF347AA0-A31F-6842-999B-72F4F5D0F40D}" type="datetimeFigureOut">
               <a:rPr lang="en-US" smtClean="0"/>
-              <a:t>2/28/16</a:t>
+              <a:t>3/1/2016</a:t>
             </a:fld>
             <a:endParaRPr lang="en-US"/>
           </a:p>
@@ -638,7 +654,7 @@
           <a:p>
             <a:fld id="{BF347AA0-A31F-6842-999B-72F4F5D0F40D}" type="datetimeFigureOut">
               <a:rPr lang="en-US" smtClean="0"/>
-              <a:t>2/28/16</a:t>
+              <a:t>3/1/2016</a:t>
             </a:fld>
             <a:endParaRPr lang="en-US"/>
           </a:p>
@@ -808,7 +824,7 @@
           <a:p>
             <a:fld id="{BF347AA0-A31F-6842-999B-72F4F5D0F40D}" type="datetimeFigureOut">
               <a:rPr lang="en-US" smtClean="0"/>
-              <a:t>2/28/16</a:t>
+              <a:t>3/1/2016</a:t>
             </a:fld>
             <a:endParaRPr lang="en-US"/>
           </a:p>
@@ -1054,7 +1070,7 @@
           <a:p>
             <a:fld id="{BF347AA0-A31F-6842-999B-72F4F5D0F40D}" type="datetimeFigureOut">
               <a:rPr lang="en-US" smtClean="0"/>
-              <a:t>2/28/16</a:t>
+              <a:t>3/1/2016</a:t>
             </a:fld>
             <a:endParaRPr lang="en-US"/>
           </a:p>
@@ -1342,7 +1358,7 @@
           <a:p>
             <a:fld id="{BF347AA0-A31F-6842-999B-72F4F5D0F40D}" type="datetimeFigureOut">
               <a:rPr lang="en-US" smtClean="0"/>
-              <a:t>2/28/16</a:t>
+              <a:t>3/1/2016</a:t>
             </a:fld>
             <a:endParaRPr lang="en-US"/>
           </a:p>
@@ -1764,7 +1780,7 @@
           <a:p>
             <a:fld id="{BF347AA0-A31F-6842-999B-72F4F5D0F40D}" type="datetimeFigureOut">
               <a:rPr lang="en-US" smtClean="0"/>
-              <a:t>2/28/16</a:t>
+              <a:t>3/1/2016</a:t>
             </a:fld>
             <a:endParaRPr lang="en-US"/>
           </a:p>
@@ -1882,7 +1898,7 @@
           <a:p>
             <a:fld id="{BF347AA0-A31F-6842-999B-72F4F5D0F40D}" type="datetimeFigureOut">
               <a:rPr lang="en-US" smtClean="0"/>
-              <a:t>2/28/16</a:t>
+              <a:t>3/1/2016</a:t>
             </a:fld>
             <a:endParaRPr lang="en-US"/>
           </a:p>
@@ -1977,7 +1993,7 @@
           <a:p>
             <a:fld id="{BF347AA0-A31F-6842-999B-72F4F5D0F40D}" type="datetimeFigureOut">
               <a:rPr lang="en-US" smtClean="0"/>
-              <a:t>2/28/16</a:t>
+              <a:t>3/1/2016</a:t>
             </a:fld>
             <a:endParaRPr lang="en-US"/>
           </a:p>
@@ -2254,7 +2270,7 @@
           <a:p>
             <a:fld id="{BF347AA0-A31F-6842-999B-72F4F5D0F40D}" type="datetimeFigureOut">
               <a:rPr lang="en-US" smtClean="0"/>
-              <a:t>2/28/16</a:t>
+              <a:t>3/1/2016</a:t>
             </a:fld>
             <a:endParaRPr lang="en-US"/>
           </a:p>
@@ -2507,7 +2523,7 @@
           <a:p>
             <a:fld id="{BF347AA0-A31F-6842-999B-72F4F5D0F40D}" type="datetimeFigureOut">
               <a:rPr lang="en-US" smtClean="0"/>
-              <a:t>2/28/16</a:t>
+              <a:t>3/1/2016</a:t>
             </a:fld>
             <a:endParaRPr lang="en-US"/>
           </a:p>
@@ -2720,7 +2736,7 @@
           <a:p>
             <a:fld id="{BF347AA0-A31F-6842-999B-72F4F5D0F40D}" type="datetimeFigureOut">
               <a:rPr lang="en-US" smtClean="0"/>
-              <a:t>2/28/16</a:t>
+              <a:t>3/1/2016</a:t>
             </a:fld>
             <a:endParaRPr lang="en-US"/>
           </a:p>
@@ -3216,8 +3232,8 @@
         </p:nvSpPr>
         <p:spPr>
           <a:xfrm>
-            <a:off x="7113697" y="2660134"/>
-            <a:ext cx="1127808" cy="400110"/>
+            <a:off x="6900337" y="2589014"/>
+            <a:ext cx="1499385" cy="523220"/>
           </a:xfrm>
           <a:prstGeom prst="rect">
             <a:avLst/>
@@ -3231,10 +3247,10 @@
           <a:lstStyle/>
           <a:p>
             <a:r>
-              <a:rPr lang="en-US" sz="2000" dirty="0" smtClean="0"/>
+              <a:rPr lang="en-US" sz="2800" dirty="0" smtClean="0"/>
               <a:t>language</a:t>
             </a:r>
-            <a:endParaRPr lang="en-US" sz="2000" dirty="0"/>
+            <a:endParaRPr lang="en-US" sz="2800" dirty="0"/>
           </a:p>
         </p:txBody>
       </p:sp>
@@ -3247,7 +3263,7 @@
         <p:spPr>
           <a:xfrm>
             <a:off x="7667058" y="3025289"/>
-            <a:ext cx="706268" cy="400110"/>
+            <a:ext cx="809837" cy="461665"/>
           </a:xfrm>
           <a:prstGeom prst="rect">
             <a:avLst/>
@@ -3261,10 +3277,10 @@
           <a:lstStyle/>
           <a:p>
             <a:r>
-              <a:rPr lang="en-US" sz="2000" dirty="0" smtClean="0"/>
+              <a:rPr lang="en-US" sz="2400" dirty="0" smtClean="0"/>
               <a:t>CMN</a:t>
             </a:r>
-            <a:endParaRPr lang="en-US" sz="2000" dirty="0"/>
+            <a:endParaRPr lang="en-US" sz="2400" dirty="0"/>
           </a:p>
         </p:txBody>
       </p:sp>
@@ -3277,7 +3293,7 @@
         <p:spPr>
           <a:xfrm>
             <a:off x="7667749" y="3320418"/>
-            <a:ext cx="674584" cy="400110"/>
+            <a:ext cx="772969" cy="461665"/>
           </a:xfrm>
           <a:prstGeom prst="rect">
             <a:avLst/>
@@ -3291,10 +3307,10 @@
           <a:lstStyle/>
           <a:p>
             <a:r>
-              <a:rPr lang="en-US" sz="2000" dirty="0" smtClean="0"/>
+              <a:rPr lang="en-US" sz="2400" dirty="0" smtClean="0"/>
               <a:t>HUN</a:t>
             </a:r>
-            <a:endParaRPr lang="en-US" sz="2000" dirty="0"/>
+            <a:endParaRPr lang="en-US" sz="2400" dirty="0"/>
           </a:p>
         </p:txBody>
       </p:sp>
@@ -3307,7 +3323,7 @@
         <p:spPr>
           <a:xfrm>
             <a:off x="7666017" y="3627799"/>
-            <a:ext cx="690488" cy="400110"/>
+            <a:ext cx="789960" cy="461665"/>
           </a:xfrm>
           <a:prstGeom prst="rect">
             <a:avLst/>
@@ -3321,10 +3337,10 @@
           <a:lstStyle/>
           <a:p>
             <a:r>
-              <a:rPr lang="en-US" sz="2000" dirty="0" smtClean="0"/>
+              <a:rPr lang="en-US" sz="2400" dirty="0" smtClean="0"/>
               <a:t>SWH</a:t>
             </a:r>
-            <a:endParaRPr lang="en-US" sz="2000" dirty="0"/>
+            <a:endParaRPr lang="en-US" sz="2400" dirty="0"/>
           </a:p>
         </p:txBody>
       </p:sp>
@@ -3336,8 +3352,8 @@
         </p:nvSpPr>
         <p:spPr>
           <a:xfrm rot="16200000">
-            <a:off x="369998" y="3190287"/>
-            <a:ext cx="2419603" cy="400110"/>
+            <a:off x="-66901" y="3128732"/>
+            <a:ext cx="3293402" cy="523220"/>
           </a:xfrm>
           <a:prstGeom prst="rect">
             <a:avLst/>
@@ -3351,10 +3367,10 @@
           <a:lstStyle/>
           <a:p>
             <a:r>
-              <a:rPr lang="en-US" sz="2000" dirty="0" smtClean="0"/>
+              <a:rPr lang="en-US" sz="2800" dirty="0" smtClean="0"/>
               <a:t>Phone error rates (%)</a:t>
             </a:r>
-            <a:endParaRPr lang="en-US" sz="2000" dirty="0"/>
+            <a:endParaRPr lang="en-US" sz="2800" dirty="0"/>
           </a:p>
         </p:txBody>
       </p:sp>
@@ -3366,8 +3382,8 @@
         </p:nvSpPr>
         <p:spPr>
           <a:xfrm>
-            <a:off x="2973497" y="6426200"/>
-            <a:ext cx="3201067" cy="400110"/>
+            <a:off x="2292777" y="6426200"/>
+            <a:ext cx="4380943" cy="523220"/>
           </a:xfrm>
           <a:prstGeom prst="rect">
             <a:avLst/>
@@ -3381,10 +3397,10 @@
           <a:lstStyle/>
           <a:p>
             <a:r>
-              <a:rPr lang="en-US" sz="2000" dirty="0" smtClean="0"/>
+              <a:rPr lang="en-US" sz="2800" dirty="0" smtClean="0"/>
               <a:t>Entropy Rate Estimates (bits)</a:t>
             </a:r>
-            <a:endParaRPr lang="en-US" sz="2000" dirty="0"/>
+            <a:endParaRPr lang="en-US" sz="2800" dirty="0"/>
           </a:p>
         </p:txBody>
       </p:sp>

</xml_diff>

<commit_message>
created the two-column version, which must be submitted together with the one-column version so that each reviewer can read whichever she prefers
</commit_message>
<xml_diff>
--- a/figs/ptperfigure.pptx
+++ b/figs/ptperfigure.pptx
@@ -3121,8 +3121,8 @@
         </p:nvGrpSpPr>
         <p:grpSpPr bwMode="auto">
           <a:xfrm>
-            <a:off x="-2177" y="-43503"/>
-            <a:ext cx="10951410" cy="6827779"/>
+            <a:off x="-2177" y="-43504"/>
+            <a:ext cx="10951410" cy="7040880"/>
             <a:chOff x="904" y="176"/>
             <a:chExt cx="4096" cy="4066"/>
           </a:xfrm>

</xml_diff>